<commit_message>
insertando imagenes a mi diapositiva
insertando imagenes a mis diapositivas
</commit_message>
<xml_diff>
--- a/DOCUMENTACIÓN/APPRECETA.pptx
+++ b/DOCUMENTACIÓN/APPRECETA.pptx
@@ -209,7 +209,7 @@
           <a:p>
             <a:fld id="{76A63ED7-DB52-40DF-ABE7-394FD9997930}" type="datetimeFigureOut">
               <a:rPr lang="es-ES" smtClean="0"/>
-              <a:t>17/07/2015</a:t>
+              <a:t>27/07/2015</a:t>
             </a:fld>
             <a:endParaRPr lang="es-ES"/>
           </a:p>
@@ -826,7 +826,7 @@
           <a:p>
             <a:fld id="{7A847CFC-816F-41D0-AAC0-9BF4FEBC753E}" type="datetimeFigureOut">
               <a:rPr lang="es-ES" smtClean="0"/>
-              <a:t>17/07/2015</a:t>
+              <a:t>27/07/2015</a:t>
             </a:fld>
             <a:endParaRPr lang="es-ES"/>
           </a:p>
@@ -991,7 +991,7 @@
           <a:p>
             <a:fld id="{7A847CFC-816F-41D0-AAC0-9BF4FEBC753E}" type="datetimeFigureOut">
               <a:rPr lang="es-ES" smtClean="0"/>
-              <a:t>17/07/2015</a:t>
+              <a:t>27/07/2015</a:t>
             </a:fld>
             <a:endParaRPr lang="es-ES"/>
           </a:p>
@@ -1166,7 +1166,7 @@
           <a:p>
             <a:fld id="{7A847CFC-816F-41D0-AAC0-9BF4FEBC753E}" type="datetimeFigureOut">
               <a:rPr lang="es-ES" smtClean="0"/>
-              <a:t>17/07/2015</a:t>
+              <a:t>27/07/2015</a:t>
             </a:fld>
             <a:endParaRPr lang="es-ES"/>
           </a:p>
@@ -1331,7 +1331,7 @@
           <a:p>
             <a:fld id="{7A847CFC-816F-41D0-AAC0-9BF4FEBC753E}" type="datetimeFigureOut">
               <a:rPr lang="es-ES" smtClean="0"/>
-              <a:t>17/07/2015</a:t>
+              <a:t>27/07/2015</a:t>
             </a:fld>
             <a:endParaRPr lang="es-ES"/>
           </a:p>
@@ -1572,7 +1572,7 @@
           <a:p>
             <a:fld id="{7A847CFC-816F-41D0-AAC0-9BF4FEBC753E}" type="datetimeFigureOut">
               <a:rPr lang="es-ES" smtClean="0"/>
-              <a:t>17/07/2015</a:t>
+              <a:t>27/07/2015</a:t>
             </a:fld>
             <a:endParaRPr lang="es-ES"/>
           </a:p>
@@ -1855,7 +1855,7 @@
           <a:p>
             <a:fld id="{7A847CFC-816F-41D0-AAC0-9BF4FEBC753E}" type="datetimeFigureOut">
               <a:rPr lang="es-ES" smtClean="0"/>
-              <a:t>17/07/2015</a:t>
+              <a:t>27/07/2015</a:t>
             </a:fld>
             <a:endParaRPr lang="es-ES"/>
           </a:p>
@@ -2272,7 +2272,7 @@
           <a:p>
             <a:fld id="{7A847CFC-816F-41D0-AAC0-9BF4FEBC753E}" type="datetimeFigureOut">
               <a:rPr lang="es-ES" smtClean="0"/>
-              <a:t>17/07/2015</a:t>
+              <a:t>27/07/2015</a:t>
             </a:fld>
             <a:endParaRPr lang="es-ES"/>
           </a:p>
@@ -2385,7 +2385,7 @@
           <a:p>
             <a:fld id="{7A847CFC-816F-41D0-AAC0-9BF4FEBC753E}" type="datetimeFigureOut">
               <a:rPr lang="es-ES" smtClean="0"/>
-              <a:t>17/07/2015</a:t>
+              <a:t>27/07/2015</a:t>
             </a:fld>
             <a:endParaRPr lang="es-ES"/>
           </a:p>
@@ -2475,7 +2475,7 @@
           <a:p>
             <a:fld id="{7A847CFC-816F-41D0-AAC0-9BF4FEBC753E}" type="datetimeFigureOut">
               <a:rPr lang="es-ES" smtClean="0"/>
-              <a:t>17/07/2015</a:t>
+              <a:t>27/07/2015</a:t>
             </a:fld>
             <a:endParaRPr lang="es-ES"/>
           </a:p>
@@ -2747,7 +2747,7 @@
           <a:p>
             <a:fld id="{7A847CFC-816F-41D0-AAC0-9BF4FEBC753E}" type="datetimeFigureOut">
               <a:rPr lang="es-ES" smtClean="0"/>
-              <a:t>17/07/2015</a:t>
+              <a:t>27/07/2015</a:t>
             </a:fld>
             <a:endParaRPr lang="es-ES"/>
           </a:p>
@@ -2995,7 +2995,7 @@
           <a:p>
             <a:fld id="{7A847CFC-816F-41D0-AAC0-9BF4FEBC753E}" type="datetimeFigureOut">
               <a:rPr lang="es-ES" smtClean="0"/>
-              <a:t>17/07/2015</a:t>
+              <a:t>27/07/2015</a:t>
             </a:fld>
             <a:endParaRPr lang="es-ES"/>
           </a:p>
@@ -3203,7 +3203,7 @@
           <a:p>
             <a:fld id="{7A847CFC-816F-41D0-AAC0-9BF4FEBC753E}" type="datetimeFigureOut">
               <a:rPr lang="es-ES" smtClean="0"/>
-              <a:t>17/07/2015</a:t>
+              <a:t>27/07/2015</a:t>
             </a:fld>
             <a:endParaRPr lang="es-ES"/>
           </a:p>
@@ -3847,24 +3847,6 @@
               </a:rPr>
               <a:t>:</a:t>
             </a:r>
-            <a:endParaRPr lang="es-ES" sz="3600" b="1" dirty="0">
-              <a:ln w="9525">
-                <a:solidFill>
-                  <a:schemeClr val="bg1"/>
-                </a:solidFill>
-                <a:prstDash val="solid"/>
-              </a:ln>
-              <a:solidFill>
-                <a:srgbClr val="002060"/>
-              </a:solidFill>
-              <a:effectLst>
-                <a:outerShdw blurRad="12700" dist="38100" dir="2700000" algn="tl" rotWithShape="0">
-                  <a:schemeClr val="bg1">
-                    <a:lumMod val="50000"/>
-                  </a:schemeClr>
-                </a:outerShdw>
-              </a:effectLst>
-            </a:endParaRPr>
           </a:p>
         </p:txBody>
       </p:sp>
@@ -4022,8 +4004,8 @@
         </p:nvSpPr>
         <p:spPr>
           <a:xfrm>
-            <a:off x="1225664" y="3767526"/>
-            <a:ext cx="6692672" cy="1015663"/>
+            <a:off x="107504" y="3704869"/>
+            <a:ext cx="6438553" cy="1015663"/>
           </a:xfrm>
           <a:prstGeom prst="rect">
             <a:avLst/>
@@ -4076,6 +4058,36 @@
           </a:p>
         </p:txBody>
       </p:sp>
+      <p:pic>
+        <p:nvPicPr>
+          <p:cNvPr id="2" name="Imagen 1"/>
+          <p:cNvPicPr>
+            <a:picLocks noChangeAspect="1"/>
+          </p:cNvPicPr>
+          <p:nvPr/>
+        </p:nvPicPr>
+        <p:blipFill>
+          <a:blip r:embed="rId6" cstate="print">
+            <a:extLst>
+              <a:ext uri="{28A0092B-C50C-407E-A947-70E740481C1C}">
+                <a14:useLocalDpi xmlns:a14="http://schemas.microsoft.com/office/drawing/2010/main" val="0"/>
+              </a:ext>
+            </a:extLst>
+          </a:blip>
+          <a:stretch>
+            <a:fillRect/>
+          </a:stretch>
+        </p:blipFill>
+        <p:spPr>
+          <a:xfrm>
+            <a:off x="6626319" y="2823342"/>
+            <a:ext cx="2478536" cy="2778719"/>
+          </a:xfrm>
+          <a:prstGeom prst="rect">
+            <a:avLst/>
+          </a:prstGeom>
+        </p:spPr>
+      </p:pic>
     </p:spTree>
     <p:extLst>
       <p:ext uri="{BB962C8B-B14F-4D97-AF65-F5344CB8AC3E}">
@@ -4227,13 +4239,13 @@
   <p:clrMapOvr>
     <a:masterClrMapping/>
   </p:clrMapOvr>
-  <mc:AlternateContent xmlns:mc="http://schemas.openxmlformats.org/markup-compatibility/2006">
-    <mc:Choice xmlns:p14="http://schemas.microsoft.com/office/powerpoint/2010/main" Requires="p14">
+  <mc:AlternateContent xmlns:mc="http://schemas.openxmlformats.org/markup-compatibility/2006" xmlns:p14="http://schemas.microsoft.com/office/powerpoint/2010/main">
+    <mc:Choice Requires="p14">
       <p:transition spd="slow" p14:dur="2000">
         <p14:prism isContent="1"/>
       </p:transition>
     </mc:Choice>
-    <mc:Fallback>
+    <mc:Fallback xmlns="">
       <p:transition spd="slow">
         <p:fade/>
       </p:transition>

</xml_diff>